<commit_message>
Atualização do Material de Apoio
</commit_message>
<xml_diff>
--- a/Material de apoio/Material de apoio - stored procedures.pptx
+++ b/Material de apoio/Material de apoio - stored procedures.pptx
@@ -14,6 +14,8 @@
     <p:sldId id="262" r:id="rId22"/>
     <p:sldId id="263" r:id="rId23"/>
     <p:sldId id="264" r:id="rId24"/>
+    <p:sldId id="265" r:id="rId25"/>
+    <p:sldId id="266" r:id="rId26"/>
   </p:sldIdLst>
   <p:sldSz cx="18288000" cy="10287000"/>
   <p:notesSz cx="6858000" cy="9144000"/>
@@ -3301,6 +3303,399 @@
 </p:sld>
 </file>
 
+<file path=ppt/slides/slide10.xml><?xml version="1.0" encoding="utf-8"?>
+<p:sld xmlns:p="http://schemas.openxmlformats.org/presentationml/2006/main" xmlns:a="http://schemas.openxmlformats.org/drawingml/2006/main" xmlns:r="http://schemas.openxmlformats.org/officeDocument/2006/relationships">
+  <p:cSld>
+    <p:bg>
+      <p:bgPr>
+        <a:solidFill>
+          <a:srgbClr val="1E1E1E"/>
+        </a:solidFill>
+      </p:bgPr>
+    </p:bg>
+    <p:spTree>
+      <p:nvGrpSpPr>
+        <p:cNvPr id="1" name=""/>
+        <p:cNvGrpSpPr/>
+        <p:nvPr/>
+      </p:nvGrpSpPr>
+      <p:grpSpPr>
+        <a:xfrm>
+          <a:off x="0" y="0"/>
+          <a:ext cx="0" cy="0"/>
+          <a:chOff x="0" y="0"/>
+          <a:chExt cx="0" cy="0"/>
+        </a:xfrm>
+      </p:grpSpPr>
+      <p:sp>
+        <p:nvSpPr>
+          <p:cNvPr name="AutoShape 2" id="2"/>
+          <p:cNvSpPr/>
+          <p:nvPr/>
+        </p:nvSpPr>
+        <p:spPr>
+          <a:xfrm rot="0">
+            <a:off x="1028700" y="2424430"/>
+            <a:ext cx="1350494" cy="239015"/>
+          </a:xfrm>
+          <a:prstGeom prst="rect">
+            <a:avLst/>
+          </a:prstGeom>
+          <a:solidFill>
+            <a:srgbClr val="024EEF"/>
+          </a:solidFill>
+        </p:spPr>
+      </p:sp>
+      <p:grpSp>
+        <p:nvGrpSpPr>
+          <p:cNvPr name="Group 3" id="3"/>
+          <p:cNvGrpSpPr/>
+          <p:nvPr/>
+        </p:nvGrpSpPr>
+        <p:grpSpPr>
+          <a:xfrm rot="0">
+            <a:off x="3141520" y="3139435"/>
+            <a:ext cx="12045094" cy="2810543"/>
+            <a:chOff x="0" y="0"/>
+            <a:chExt cx="16060126" cy="3747391"/>
+          </a:xfrm>
+        </p:grpSpPr>
+        <p:pic>
+          <p:nvPicPr>
+            <p:cNvPr name="Picture 4" id="4"/>
+            <p:cNvPicPr>
+              <a:picLocks noChangeAspect="true"/>
+            </p:cNvPicPr>
+            <p:nvPr/>
+          </p:nvPicPr>
+          <p:blipFill>
+            <a:blip r:embed="rId2"/>
+            <a:srcRect l="0" t="0" r="0" b="0"/>
+            <a:stretch>
+              <a:fillRect/>
+            </a:stretch>
+          </p:blipFill>
+          <p:spPr>
+            <a:xfrm flipH="false" flipV="false" rot="0">
+              <a:off x="0" y="0"/>
+              <a:ext cx="16060126" cy="3106466"/>
+            </a:xfrm>
+            <a:prstGeom prst="rect">
+              <a:avLst/>
+            </a:prstGeom>
+          </p:spPr>
+        </p:pic>
+        <p:sp>
+          <p:nvSpPr>
+            <p:cNvPr name="TextBox 5" id="5"/>
+            <p:cNvSpPr txBox="true"/>
+            <p:nvPr/>
+          </p:nvSpPr>
+          <p:spPr>
+            <a:xfrm rot="0">
+              <a:off x="0" y="3020741"/>
+              <a:ext cx="16006614" cy="726650"/>
+            </a:xfrm>
+            <a:prstGeom prst="rect">
+              <a:avLst/>
+            </a:prstGeom>
+          </p:spPr>
+          <p:txBody>
+            <a:bodyPr anchor="t" rtlCol="false" tIns="0" lIns="0" bIns="0" rIns="0">
+              <a:spAutoFit/>
+            </a:bodyPr>
+            <a:lstStyle/>
+            <a:p>
+              <a:pPr>
+                <a:lnSpc>
+                  <a:spcPts val="4480"/>
+                </a:lnSpc>
+              </a:pPr>
+              <a:r>
+                <a:rPr lang="en-US" sz="3200">
+                  <a:solidFill>
+                    <a:srgbClr val="FFFFFF"/>
+                  </a:solidFill>
+                  <a:latin typeface="Arialle"/>
+                </a:rPr>
+                <a:t>https://www.youtube.com/watch?v=uj3QHQOsV3M</a:t>
+              </a:r>
+            </a:p>
+          </p:txBody>
+        </p:sp>
+      </p:grpSp>
+      <p:pic>
+        <p:nvPicPr>
+          <p:cNvPr name="Picture 6" id="6"/>
+          <p:cNvPicPr>
+            <a:picLocks noChangeAspect="true"/>
+          </p:cNvPicPr>
+          <p:nvPr/>
+        </p:nvPicPr>
+        <p:blipFill>
+          <a:blip r:embed="rId3"/>
+          <a:srcRect l="0" t="0" r="0" b="0"/>
+          <a:stretch>
+            <a:fillRect/>
+          </a:stretch>
+        </p:blipFill>
+        <p:spPr>
+          <a:xfrm flipH="false" flipV="false" rot="0">
+            <a:off x="3116368" y="6338227"/>
+            <a:ext cx="12030112" cy="2271976"/>
+          </a:xfrm>
+          <a:prstGeom prst="rect">
+            <a:avLst/>
+          </a:prstGeom>
+        </p:spPr>
+      </p:pic>
+      <p:sp>
+        <p:nvSpPr>
+          <p:cNvPr name="TextBox 7" id="7"/>
+          <p:cNvSpPr txBox="true"/>
+          <p:nvPr/>
+        </p:nvSpPr>
+        <p:spPr>
+          <a:xfrm rot="0">
+            <a:off x="3141520" y="8524478"/>
+            <a:ext cx="12004960" cy="566419"/>
+          </a:xfrm>
+          <a:prstGeom prst="rect">
+            <a:avLst/>
+          </a:prstGeom>
+        </p:spPr>
+        <p:txBody>
+          <a:bodyPr anchor="t" rtlCol="false" tIns="0" lIns="0" bIns="0" rIns="0">
+            <a:spAutoFit/>
+          </a:bodyPr>
+          <a:lstStyle/>
+          <a:p>
+            <a:pPr>
+              <a:lnSpc>
+                <a:spcPts val="4480"/>
+              </a:lnSpc>
+            </a:pPr>
+            <a:r>
+              <a:rPr lang="en-US" sz="3200">
+                <a:solidFill>
+                  <a:srgbClr val="FFFFFF"/>
+                </a:solidFill>
+                <a:latin typeface="Arialle"/>
+              </a:rPr>
+              <a:t>https://www.youtube.com/watch?v=N3gvsXPyFt4</a:t>
+            </a:r>
+          </a:p>
+        </p:txBody>
+      </p:sp>
+      <p:sp>
+        <p:nvSpPr>
+          <p:cNvPr name="TextBox 8" id="8"/>
+          <p:cNvSpPr txBox="true"/>
+          <p:nvPr/>
+        </p:nvSpPr>
+        <p:spPr>
+          <a:xfrm rot="0">
+            <a:off x="1028700" y="1200150"/>
+            <a:ext cx="11588694" cy="1224280"/>
+          </a:xfrm>
+          <a:prstGeom prst="rect">
+            <a:avLst/>
+          </a:prstGeom>
+        </p:spPr>
+        <p:txBody>
+          <a:bodyPr anchor="t" rtlCol="false" tIns="0" lIns="0" bIns="0" rIns="0">
+            <a:spAutoFit/>
+          </a:bodyPr>
+          <a:lstStyle/>
+          <a:p>
+            <a:pPr>
+              <a:lnSpc>
+                <a:spcPts val="9200"/>
+              </a:lnSpc>
+            </a:pPr>
+            <a:r>
+              <a:rPr lang="en-US" sz="9200">
+                <a:solidFill>
+                  <a:srgbClr val="FFFFFF"/>
+                </a:solidFill>
+                <a:latin typeface="Bebas Neue"/>
+              </a:rPr>
+              <a:t>Vídeos</a:t>
+            </a:r>
+          </a:p>
+        </p:txBody>
+      </p:sp>
+    </p:spTree>
+  </p:cSld>
+  <p:clrMapOvr>
+    <a:masterClrMapping/>
+  </p:clrMapOvr>
+</p:sld>
+</file>
+
+<file path=ppt/slides/slide11.xml><?xml version="1.0" encoding="utf-8"?>
+<p:sld xmlns:p="http://schemas.openxmlformats.org/presentationml/2006/main" xmlns:a="http://schemas.openxmlformats.org/drawingml/2006/main">
+  <p:cSld>
+    <p:bg>
+      <p:bgPr>
+        <a:solidFill>
+          <a:srgbClr val="1E1E1E"/>
+        </a:solidFill>
+      </p:bgPr>
+    </p:bg>
+    <p:spTree>
+      <p:nvGrpSpPr>
+        <p:cNvPr id="1" name=""/>
+        <p:cNvGrpSpPr/>
+        <p:nvPr/>
+      </p:nvGrpSpPr>
+      <p:grpSpPr>
+        <a:xfrm>
+          <a:off x="0" y="0"/>
+          <a:ext cx="0" cy="0"/>
+          <a:chOff x="0" y="0"/>
+          <a:chExt cx="0" cy="0"/>
+        </a:xfrm>
+      </p:grpSpPr>
+      <p:sp>
+        <p:nvSpPr>
+          <p:cNvPr name="TextBox 2" id="2"/>
+          <p:cNvSpPr txBox="true"/>
+          <p:nvPr/>
+        </p:nvSpPr>
+        <p:spPr>
+          <a:xfrm rot="0">
+            <a:off x="1028700" y="771525"/>
+            <a:ext cx="4584649" cy="1572957"/>
+          </a:xfrm>
+          <a:prstGeom prst="rect">
+            <a:avLst/>
+          </a:prstGeom>
+        </p:spPr>
+        <p:txBody>
+          <a:bodyPr anchor="t" rtlCol="false" tIns="0" lIns="0" bIns="0" rIns="0">
+            <a:spAutoFit/>
+          </a:bodyPr>
+          <a:lstStyle/>
+          <a:p>
+            <a:pPr algn="r">
+              <a:lnSpc>
+                <a:spcPts val="13091"/>
+              </a:lnSpc>
+            </a:pPr>
+            <a:r>
+              <a:rPr lang="en-US" sz="8727">
+                <a:solidFill>
+                  <a:srgbClr val="FFFFFF"/>
+                </a:solidFill>
+                <a:latin typeface="Bebas Neue"/>
+              </a:rPr>
+              <a:t>Referências:</a:t>
+            </a:r>
+          </a:p>
+        </p:txBody>
+      </p:sp>
+      <p:sp>
+        <p:nvSpPr>
+          <p:cNvPr name="AutoShape 3" id="3"/>
+          <p:cNvSpPr/>
+          <p:nvPr/>
+        </p:nvSpPr>
+        <p:spPr>
+          <a:xfrm rot="0">
+            <a:off x="1028700" y="9248775"/>
+            <a:ext cx="13525126" cy="40984"/>
+          </a:xfrm>
+          <a:prstGeom prst="rect">
+            <a:avLst/>
+          </a:prstGeom>
+          <a:solidFill>
+            <a:srgbClr val="FFFFFF">
+              <a:alpha val="29804"/>
+            </a:srgbClr>
+          </a:solidFill>
+        </p:spPr>
+      </p:sp>
+      <p:sp>
+        <p:nvSpPr>
+          <p:cNvPr name="TextBox 4" id="4"/>
+          <p:cNvSpPr txBox="true"/>
+          <p:nvPr/>
+        </p:nvSpPr>
+        <p:spPr>
+          <a:xfrm rot="0">
+            <a:off x="1028700" y="2258757"/>
+            <a:ext cx="15786383" cy="3376294"/>
+          </a:xfrm>
+          <a:prstGeom prst="rect">
+            <a:avLst/>
+          </a:prstGeom>
+        </p:spPr>
+        <p:txBody>
+          <a:bodyPr anchor="t" rtlCol="false" tIns="0" lIns="0" bIns="0" rIns="0">
+            <a:spAutoFit/>
+          </a:bodyPr>
+          <a:lstStyle/>
+          <a:p>
+            <a:pPr>
+              <a:lnSpc>
+                <a:spcPts val="4480"/>
+              </a:lnSpc>
+            </a:pPr>
+            <a:r>
+              <a:rPr lang="en-US" sz="3200">
+                <a:solidFill>
+                  <a:srgbClr val="FFFFFF"/>
+                </a:solidFill>
+                <a:latin typeface="Arialle"/>
+              </a:rPr>
+              <a:t>CASERTA, Thiago. "Introdução aos Stored Procedures no SQL Server". DevMedia. Disponível em: https://www.devmedia.com.br/introducao-aos-stored-procedures-no-sql-server/7904. Acesso em: 11/08/2021 às 15:48.</a:t>
+            </a:r>
+          </a:p>
+          <a:p>
+            <a:pPr>
+              <a:lnSpc>
+                <a:spcPts val="4480"/>
+              </a:lnSpc>
+            </a:pPr>
+            <a:r>
+              <a:rPr lang="en-US" sz="3200">
+                <a:solidFill>
+                  <a:srgbClr val="FFFFFF"/>
+                </a:solidFill>
+                <a:latin typeface="Arialle"/>
+              </a:rPr>
+              <a:t>MONTEIRO, Danielle. "</a:t>
+            </a:r>
+            <a:r>
+              <a:rPr lang="en-US" sz="3200">
+                <a:solidFill>
+                  <a:srgbClr val="FFFFFF"/>
+                </a:solidFill>
+                <a:latin typeface="Arialle Bold"/>
+              </a:rPr>
+              <a:t>Afinal de contas, o que é uma Stored Procedure?</a:t>
+            </a:r>
+            <a:r>
+              <a:rPr lang="en-US" sz="3200">
+                <a:solidFill>
+                  <a:srgbClr val="FFFFFF"/>
+                </a:solidFill>
+                <a:latin typeface="Arialle"/>
+              </a:rPr>
+              <a:t>". IMasters. Disponível em: https://imasters.com.br/banco-de-dados/afinal-de-contas-o-que-e-uma-stored-procedure. Acesso em: 11/08/2021 às 15:40.</a:t>
+            </a:r>
+          </a:p>
+        </p:txBody>
+      </p:sp>
+    </p:spTree>
+  </p:cSld>
+  <p:clrMapOvr>
+    <a:masterClrMapping/>
+  </p:clrMapOvr>
+</p:sld>
+</file>
+
 <file path=ppt/slides/slide2.xml><?xml version="1.0" encoding="utf-8"?>
 <p:sld xmlns:p="http://schemas.openxmlformats.org/presentationml/2006/main" xmlns:a="http://schemas.openxmlformats.org/drawingml/2006/main">
   <p:cSld>
@@ -3565,7 +3960,7 @@
                 </a:solidFill>
                 <a:latin typeface="Bebas Neue"/>
               </a:rPr>
-              <a:t>Procedures com parâmetro de entrada e saída</a:t>
+              <a:t>como criar uma Procedure com validação</a:t>
             </a:r>
           </a:p>
         </p:txBody>
@@ -4402,6 +4797,396 @@
     <p:bg>
       <p:bgPr>
         <a:solidFill>
+          <a:srgbClr val="000000"/>
+        </a:solidFill>
+      </p:bgPr>
+    </p:bg>
+    <p:spTree>
+      <p:nvGrpSpPr>
+        <p:cNvPr id="1" name=""/>
+        <p:cNvGrpSpPr/>
+        <p:nvPr/>
+      </p:nvGrpSpPr>
+      <p:grpSpPr>
+        <a:xfrm>
+          <a:off x="0" y="0"/>
+          <a:ext cx="0" cy="0"/>
+          <a:chOff x="0" y="0"/>
+          <a:chExt cx="0" cy="0"/>
+        </a:xfrm>
+      </p:grpSpPr>
+      <p:sp>
+        <p:nvSpPr>
+          <p:cNvPr name="AutoShape 2" id="2"/>
+          <p:cNvSpPr/>
+          <p:nvPr/>
+        </p:nvSpPr>
+        <p:spPr>
+          <a:xfrm rot="0">
+            <a:off x="1028700" y="2746364"/>
+            <a:ext cx="1350494" cy="239015"/>
+          </a:xfrm>
+          <a:prstGeom prst="rect">
+            <a:avLst/>
+          </a:prstGeom>
+          <a:solidFill>
+            <a:srgbClr val="024EEF"/>
+          </a:solidFill>
+        </p:spPr>
+      </p:sp>
+      <p:pic>
+        <p:nvPicPr>
+          <p:cNvPr name="Picture 3" id="3"/>
+          <p:cNvPicPr>
+            <a:picLocks noChangeAspect="true"/>
+          </p:cNvPicPr>
+          <p:nvPr/>
+        </p:nvPicPr>
+        <p:blipFill>
+          <a:blip r:embed="rId2"/>
+          <a:srcRect l="0" t="0" r="0" b="0"/>
+          <a:stretch>
+            <a:fillRect/>
+          </a:stretch>
+        </p:blipFill>
+        <p:spPr>
+          <a:xfrm flipH="false" flipV="false" rot="0">
+            <a:off x="1028700" y="3261385"/>
+            <a:ext cx="6637649" cy="6369302"/>
+          </a:xfrm>
+          <a:prstGeom prst="rect">
+            <a:avLst/>
+          </a:prstGeom>
+        </p:spPr>
+      </p:pic>
+      <p:sp>
+        <p:nvSpPr>
+          <p:cNvPr name="TextBox 4" id="4"/>
+          <p:cNvSpPr txBox="true"/>
+          <p:nvPr/>
+        </p:nvSpPr>
+        <p:spPr>
+          <a:xfrm rot="0">
+            <a:off x="1028700" y="599048"/>
+            <a:ext cx="10064135" cy="2386330"/>
+          </a:xfrm>
+          <a:prstGeom prst="rect">
+            <a:avLst/>
+          </a:prstGeom>
+        </p:spPr>
+        <p:txBody>
+          <a:bodyPr anchor="t" rtlCol="false" tIns="0" lIns="0" bIns="0" rIns="0">
+            <a:spAutoFit/>
+          </a:bodyPr>
+          <a:lstStyle/>
+          <a:p>
+            <a:pPr>
+              <a:lnSpc>
+                <a:spcPts val="9200"/>
+              </a:lnSpc>
+            </a:pPr>
+            <a:r>
+              <a:rPr lang="en-US" sz="9200">
+                <a:solidFill>
+                  <a:srgbClr val="FFFFFF"/>
+                </a:solidFill>
+                <a:latin typeface="Bebas Neue"/>
+              </a:rPr>
+              <a:t>como criar uma Procedure com validação</a:t>
+            </a:r>
+          </a:p>
+        </p:txBody>
+      </p:sp>
+    </p:spTree>
+  </p:cSld>
+  <p:clrMapOvr>
+    <a:masterClrMapping/>
+  </p:clrMapOvr>
+</p:sld>
+</file>
+
+<file path=ppt/slides/slide8.xml><?xml version="1.0" encoding="utf-8"?>
+<p:sld xmlns:p="http://schemas.openxmlformats.org/presentationml/2006/main" xmlns:a="http://schemas.openxmlformats.org/drawingml/2006/main" xmlns:r="http://schemas.openxmlformats.org/officeDocument/2006/relationships">
+  <p:cSld>
+    <p:bg>
+      <p:bgPr>
+        <a:solidFill>
+          <a:srgbClr val="000000"/>
+        </a:solidFill>
+      </p:bgPr>
+    </p:bg>
+    <p:spTree>
+      <p:nvGrpSpPr>
+        <p:cNvPr id="1" name=""/>
+        <p:cNvGrpSpPr/>
+        <p:nvPr/>
+      </p:nvGrpSpPr>
+      <p:grpSpPr>
+        <a:xfrm>
+          <a:off x="0" y="0"/>
+          <a:ext cx="0" cy="0"/>
+          <a:chOff x="0" y="0"/>
+          <a:chExt cx="0" cy="0"/>
+        </a:xfrm>
+      </p:grpSpPr>
+      <p:sp>
+        <p:nvSpPr>
+          <p:cNvPr name="AutoShape 2" id="2"/>
+          <p:cNvSpPr/>
+          <p:nvPr/>
+        </p:nvSpPr>
+        <p:spPr>
+          <a:xfrm rot="0">
+            <a:off x="1028700" y="9154906"/>
+            <a:ext cx="5200650" cy="48076"/>
+          </a:xfrm>
+          <a:prstGeom prst="rect">
+            <a:avLst/>
+          </a:prstGeom>
+          <a:solidFill>
+            <a:srgbClr val="FFFFFF">
+              <a:alpha val="29804"/>
+            </a:srgbClr>
+          </a:solidFill>
+        </p:spPr>
+      </p:sp>
+      <p:sp>
+        <p:nvSpPr>
+          <p:cNvPr name="AutoShape 3" id="3"/>
+          <p:cNvSpPr/>
+          <p:nvPr/>
+        </p:nvSpPr>
+        <p:spPr>
+          <a:xfrm rot="0">
+            <a:off x="1028700" y="3036654"/>
+            <a:ext cx="1350494" cy="239015"/>
+          </a:xfrm>
+          <a:prstGeom prst="rect">
+            <a:avLst/>
+          </a:prstGeom>
+          <a:solidFill>
+            <a:srgbClr val="024EEF"/>
+          </a:solidFill>
+        </p:spPr>
+      </p:sp>
+      <p:pic>
+        <p:nvPicPr>
+          <p:cNvPr name="Picture 4" id="4"/>
+          <p:cNvPicPr>
+            <a:picLocks noChangeAspect="true"/>
+          </p:cNvPicPr>
+          <p:nvPr/>
+        </p:nvPicPr>
+        <p:blipFill>
+          <a:blip r:embed="rId2"/>
+          <a:srcRect l="0" t="0" r="0" b="0"/>
+          <a:stretch>
+            <a:fillRect/>
+          </a:stretch>
+        </p:blipFill>
+        <p:spPr>
+          <a:xfrm flipH="false" flipV="false" rot="0">
+            <a:off x="1028700" y="3917698"/>
+            <a:ext cx="6171715" cy="5922204"/>
+          </a:xfrm>
+          <a:prstGeom prst="rect">
+            <a:avLst/>
+          </a:prstGeom>
+        </p:spPr>
+      </p:pic>
+      <p:grpSp>
+        <p:nvGrpSpPr>
+          <p:cNvPr name="Group 5" id="5"/>
+          <p:cNvGrpSpPr/>
+          <p:nvPr/>
+        </p:nvGrpSpPr>
+        <p:grpSpPr>
+          <a:xfrm rot="0">
+            <a:off x="9344223" y="3917698"/>
+            <a:ext cx="3835552" cy="2144984"/>
+            <a:chOff x="0" y="0"/>
+            <a:chExt cx="5114069" cy="2859979"/>
+          </a:xfrm>
+        </p:grpSpPr>
+        <p:pic>
+          <p:nvPicPr>
+            <p:cNvPr name="Picture 6" id="6"/>
+            <p:cNvPicPr>
+              <a:picLocks noChangeAspect="true"/>
+            </p:cNvPicPr>
+            <p:nvPr/>
+          </p:nvPicPr>
+          <p:blipFill>
+            <a:blip r:embed="rId3"/>
+            <a:srcRect l="0" t="0" r="0" b="0"/>
+            <a:stretch>
+              <a:fillRect/>
+            </a:stretch>
+          </p:blipFill>
+          <p:spPr>
+            <a:xfrm flipH="false" flipV="false" rot="0">
+              <a:off x="0" y="1249249"/>
+              <a:ext cx="5114069" cy="1610730"/>
+            </a:xfrm>
+            <a:prstGeom prst="rect">
+              <a:avLst/>
+            </a:prstGeom>
+          </p:spPr>
+        </p:pic>
+        <p:sp>
+          <p:nvSpPr>
+            <p:cNvPr name="TextBox 7" id="7"/>
+            <p:cNvSpPr txBox="true"/>
+            <p:nvPr/>
+          </p:nvSpPr>
+          <p:spPr>
+            <a:xfrm rot="0">
+              <a:off x="0" y="47625"/>
+              <a:ext cx="5114069" cy="1201624"/>
+            </a:xfrm>
+            <a:prstGeom prst="rect">
+              <a:avLst/>
+            </a:prstGeom>
+          </p:spPr>
+          <p:txBody>
+            <a:bodyPr anchor="t" rtlCol="false" tIns="0" lIns="0" bIns="0" rIns="0">
+              <a:spAutoFit/>
+            </a:bodyPr>
+            <a:lstStyle/>
+            <a:p>
+              <a:pPr>
+                <a:lnSpc>
+                  <a:spcPts val="3420"/>
+                </a:lnSpc>
+              </a:pPr>
+              <a:r>
+                <a:rPr lang="en-US" sz="3420">
+                  <a:solidFill>
+                    <a:srgbClr val="FFFFFF"/>
+                  </a:solidFill>
+                  <a:latin typeface="Bebas Neue"/>
+                </a:rPr>
+                <a:t>RESULTADO CASO TIPO DE PET EXISTA</a:t>
+              </a:r>
+            </a:p>
+          </p:txBody>
+        </p:sp>
+      </p:grpSp>
+      <p:pic>
+        <p:nvPicPr>
+          <p:cNvPr name="Picture 8" id="8"/>
+          <p:cNvPicPr>
+            <a:picLocks noChangeAspect="true"/>
+          </p:cNvPicPr>
+          <p:nvPr/>
+        </p:nvPicPr>
+        <p:blipFill>
+          <a:blip r:embed="rId4"/>
+          <a:srcRect l="0" t="0" r="3228" b="1128"/>
+          <a:stretch>
+            <a:fillRect/>
+          </a:stretch>
+        </p:blipFill>
+        <p:spPr>
+          <a:xfrm flipH="false" flipV="false" rot="0">
+            <a:off x="13710678" y="5109750"/>
+            <a:ext cx="3548622" cy="2593019"/>
+          </a:xfrm>
+          <a:prstGeom prst="rect">
+            <a:avLst/>
+          </a:prstGeom>
+        </p:spPr>
+      </p:pic>
+      <p:sp>
+        <p:nvSpPr>
+          <p:cNvPr name="TextBox 9" id="9"/>
+          <p:cNvSpPr txBox="true"/>
+          <p:nvPr/>
+        </p:nvSpPr>
+        <p:spPr>
+          <a:xfrm rot="0">
+            <a:off x="13710678" y="3965323"/>
+            <a:ext cx="3125948" cy="1144427"/>
+          </a:xfrm>
+          <a:prstGeom prst="rect">
+            <a:avLst/>
+          </a:prstGeom>
+        </p:spPr>
+        <p:txBody>
+          <a:bodyPr anchor="t" rtlCol="false" tIns="0" lIns="0" bIns="0" rIns="0">
+            <a:spAutoFit/>
+          </a:bodyPr>
+          <a:lstStyle/>
+          <a:p>
+            <a:pPr>
+              <a:lnSpc>
+                <a:spcPts val="2994"/>
+              </a:lnSpc>
+            </a:pPr>
+            <a:r>
+              <a:rPr lang="en-US" sz="2994">
+                <a:solidFill>
+                  <a:srgbClr val="FFFFFF"/>
+                </a:solidFill>
+                <a:latin typeface="Bebas Neue"/>
+              </a:rPr>
+              <a:t>RESULTADO CASO TIPO DE PET NÃO EXISTA, COMO 'PEIXE'</a:t>
+            </a:r>
+          </a:p>
+        </p:txBody>
+      </p:sp>
+      <p:sp>
+        <p:nvSpPr>
+          <p:cNvPr name="TextBox 10" id="10"/>
+          <p:cNvSpPr txBox="true"/>
+          <p:nvPr/>
+        </p:nvSpPr>
+        <p:spPr>
+          <a:xfrm rot="0">
+            <a:off x="1028700" y="1350092"/>
+            <a:ext cx="7547538" cy="1686562"/>
+          </a:xfrm>
+          <a:prstGeom prst="rect">
+            <a:avLst/>
+          </a:prstGeom>
+        </p:spPr>
+        <p:txBody>
+          <a:bodyPr anchor="t" rtlCol="false" tIns="0" lIns="0" bIns="0" rIns="0">
+            <a:spAutoFit/>
+          </a:bodyPr>
+          <a:lstStyle/>
+          <a:p>
+            <a:pPr>
+              <a:lnSpc>
+                <a:spcPts val="6400"/>
+              </a:lnSpc>
+            </a:pPr>
+            <a:r>
+              <a:rPr lang="en-US" sz="6400">
+                <a:solidFill>
+                  <a:srgbClr val="FFFFFF"/>
+                </a:solidFill>
+                <a:latin typeface="Bebas Neue"/>
+              </a:rPr>
+              <a:t>como criar uma Procedure com validação</a:t>
+            </a:r>
+          </a:p>
+        </p:txBody>
+      </p:sp>
+    </p:spTree>
+  </p:cSld>
+  <p:clrMapOvr>
+    <a:masterClrMapping/>
+  </p:clrMapOvr>
+</p:sld>
+</file>
+
+<file path=ppt/slides/slide9.xml><?xml version="1.0" encoding="utf-8"?>
+<p:sld xmlns:p="http://schemas.openxmlformats.org/presentationml/2006/main" xmlns:a="http://schemas.openxmlformats.org/drawingml/2006/main" xmlns:r="http://schemas.openxmlformats.org/officeDocument/2006/relationships">
+  <p:cSld>
+    <p:bg>
+      <p:bgPr>
+        <a:solidFill>
           <a:srgbClr val="1E1E1E"/>
         </a:solidFill>
       </p:bgPr>
@@ -4633,365 +5418,6 @@
           </p:txBody>
         </p:sp>
       </p:grpSp>
-    </p:spTree>
-  </p:cSld>
-  <p:clrMapOvr>
-    <a:masterClrMapping/>
-  </p:clrMapOvr>
-</p:sld>
-</file>
-
-<file path=ppt/slides/slide8.xml><?xml version="1.0" encoding="utf-8"?>
-<p:sld xmlns:p="http://schemas.openxmlformats.org/presentationml/2006/main" xmlns:a="http://schemas.openxmlformats.org/drawingml/2006/main" xmlns:r="http://schemas.openxmlformats.org/officeDocument/2006/relationships">
-  <p:cSld>
-    <p:bg>
-      <p:bgPr>
-        <a:solidFill>
-          <a:srgbClr val="1E1E1E"/>
-        </a:solidFill>
-      </p:bgPr>
-    </p:bg>
-    <p:spTree>
-      <p:nvGrpSpPr>
-        <p:cNvPr id="1" name=""/>
-        <p:cNvGrpSpPr/>
-        <p:nvPr/>
-      </p:nvGrpSpPr>
-      <p:grpSpPr>
-        <a:xfrm>
-          <a:off x="0" y="0"/>
-          <a:ext cx="0" cy="0"/>
-          <a:chOff x="0" y="0"/>
-          <a:chExt cx="0" cy="0"/>
-        </a:xfrm>
-      </p:grpSpPr>
-      <p:sp>
-        <p:nvSpPr>
-          <p:cNvPr name="AutoShape 2" id="2"/>
-          <p:cNvSpPr/>
-          <p:nvPr/>
-        </p:nvSpPr>
-        <p:spPr>
-          <a:xfrm rot="0">
-            <a:off x="1028700" y="2424430"/>
-            <a:ext cx="1350494" cy="239015"/>
-          </a:xfrm>
-          <a:prstGeom prst="rect">
-            <a:avLst/>
-          </a:prstGeom>
-          <a:solidFill>
-            <a:srgbClr val="024EEF"/>
-          </a:solidFill>
-        </p:spPr>
-      </p:sp>
-      <p:grpSp>
-        <p:nvGrpSpPr>
-          <p:cNvPr name="Group 3" id="3"/>
-          <p:cNvGrpSpPr/>
-          <p:nvPr/>
-        </p:nvGrpSpPr>
-        <p:grpSpPr>
-          <a:xfrm rot="0">
-            <a:off x="3141520" y="3139435"/>
-            <a:ext cx="12045094" cy="2810543"/>
-            <a:chOff x="0" y="0"/>
-            <a:chExt cx="16060126" cy="3747391"/>
-          </a:xfrm>
-        </p:grpSpPr>
-        <p:pic>
-          <p:nvPicPr>
-            <p:cNvPr name="Picture 4" id="4"/>
-            <p:cNvPicPr>
-              <a:picLocks noChangeAspect="true"/>
-            </p:cNvPicPr>
-            <p:nvPr/>
-          </p:nvPicPr>
-          <p:blipFill>
-            <a:blip r:embed="rId2"/>
-            <a:srcRect l="0" t="0" r="0" b="0"/>
-            <a:stretch>
-              <a:fillRect/>
-            </a:stretch>
-          </p:blipFill>
-          <p:spPr>
-            <a:xfrm flipH="false" flipV="false" rot="0">
-              <a:off x="0" y="0"/>
-              <a:ext cx="16060126" cy="3106466"/>
-            </a:xfrm>
-            <a:prstGeom prst="rect">
-              <a:avLst/>
-            </a:prstGeom>
-          </p:spPr>
-        </p:pic>
-        <p:sp>
-          <p:nvSpPr>
-            <p:cNvPr name="TextBox 5" id="5"/>
-            <p:cNvSpPr txBox="true"/>
-            <p:nvPr/>
-          </p:nvSpPr>
-          <p:spPr>
-            <a:xfrm rot="0">
-              <a:off x="0" y="3020741"/>
-              <a:ext cx="16006614" cy="726650"/>
-            </a:xfrm>
-            <a:prstGeom prst="rect">
-              <a:avLst/>
-            </a:prstGeom>
-          </p:spPr>
-          <p:txBody>
-            <a:bodyPr anchor="t" rtlCol="false" tIns="0" lIns="0" bIns="0" rIns="0">
-              <a:spAutoFit/>
-            </a:bodyPr>
-            <a:lstStyle/>
-            <a:p>
-              <a:pPr>
-                <a:lnSpc>
-                  <a:spcPts val="4480"/>
-                </a:lnSpc>
-              </a:pPr>
-              <a:r>
-                <a:rPr lang="en-US" sz="3200">
-                  <a:solidFill>
-                    <a:srgbClr val="FFFFFF"/>
-                  </a:solidFill>
-                  <a:latin typeface="Arialle"/>
-                </a:rPr>
-                <a:t>https://www.youtube.com/watch?v=uj3QHQOsV3M</a:t>
-              </a:r>
-            </a:p>
-          </p:txBody>
-        </p:sp>
-      </p:grpSp>
-      <p:pic>
-        <p:nvPicPr>
-          <p:cNvPr name="Picture 6" id="6"/>
-          <p:cNvPicPr>
-            <a:picLocks noChangeAspect="true"/>
-          </p:cNvPicPr>
-          <p:nvPr/>
-        </p:nvPicPr>
-        <p:blipFill>
-          <a:blip r:embed="rId3"/>
-          <a:srcRect l="0" t="0" r="0" b="0"/>
-          <a:stretch>
-            <a:fillRect/>
-          </a:stretch>
-        </p:blipFill>
-        <p:spPr>
-          <a:xfrm flipH="false" flipV="false" rot="0">
-            <a:off x="3116368" y="6338227"/>
-            <a:ext cx="12030112" cy="2271976"/>
-          </a:xfrm>
-          <a:prstGeom prst="rect">
-            <a:avLst/>
-          </a:prstGeom>
-        </p:spPr>
-      </p:pic>
-      <p:sp>
-        <p:nvSpPr>
-          <p:cNvPr name="TextBox 7" id="7"/>
-          <p:cNvSpPr txBox="true"/>
-          <p:nvPr/>
-        </p:nvSpPr>
-        <p:spPr>
-          <a:xfrm rot="0">
-            <a:off x="3141520" y="8524478"/>
-            <a:ext cx="12004960" cy="566419"/>
-          </a:xfrm>
-          <a:prstGeom prst="rect">
-            <a:avLst/>
-          </a:prstGeom>
-        </p:spPr>
-        <p:txBody>
-          <a:bodyPr anchor="t" rtlCol="false" tIns="0" lIns="0" bIns="0" rIns="0">
-            <a:spAutoFit/>
-          </a:bodyPr>
-          <a:lstStyle/>
-          <a:p>
-            <a:pPr>
-              <a:lnSpc>
-                <a:spcPts val="4480"/>
-              </a:lnSpc>
-            </a:pPr>
-            <a:r>
-              <a:rPr lang="en-US" sz="3200">
-                <a:solidFill>
-                  <a:srgbClr val="FFFFFF"/>
-                </a:solidFill>
-                <a:latin typeface="Arialle"/>
-              </a:rPr>
-              <a:t>https://www.youtube.com/watch?v=N3gvsXPyFt4</a:t>
-            </a:r>
-          </a:p>
-        </p:txBody>
-      </p:sp>
-      <p:sp>
-        <p:nvSpPr>
-          <p:cNvPr name="TextBox 8" id="8"/>
-          <p:cNvSpPr txBox="true"/>
-          <p:nvPr/>
-        </p:nvSpPr>
-        <p:spPr>
-          <a:xfrm rot="0">
-            <a:off x="1028700" y="1200150"/>
-            <a:ext cx="11588694" cy="1224280"/>
-          </a:xfrm>
-          <a:prstGeom prst="rect">
-            <a:avLst/>
-          </a:prstGeom>
-        </p:spPr>
-        <p:txBody>
-          <a:bodyPr anchor="t" rtlCol="false" tIns="0" lIns="0" bIns="0" rIns="0">
-            <a:spAutoFit/>
-          </a:bodyPr>
-          <a:lstStyle/>
-          <a:p>
-            <a:pPr>
-              <a:lnSpc>
-                <a:spcPts val="9200"/>
-              </a:lnSpc>
-            </a:pPr>
-            <a:r>
-              <a:rPr lang="en-US" sz="9200">
-                <a:solidFill>
-                  <a:srgbClr val="FFFFFF"/>
-                </a:solidFill>
-                <a:latin typeface="Bebas Neue"/>
-              </a:rPr>
-              <a:t>Vídeos</a:t>
-            </a:r>
-          </a:p>
-        </p:txBody>
-      </p:sp>
-    </p:spTree>
-  </p:cSld>
-  <p:clrMapOvr>
-    <a:masterClrMapping/>
-  </p:clrMapOvr>
-</p:sld>
-</file>
-
-<file path=ppt/slides/slide9.xml><?xml version="1.0" encoding="utf-8"?>
-<p:sld xmlns:p="http://schemas.openxmlformats.org/presentationml/2006/main" xmlns:a="http://schemas.openxmlformats.org/drawingml/2006/main">
-  <p:cSld>
-    <p:bg>
-      <p:bgPr>
-        <a:solidFill>
-          <a:srgbClr val="1E1E1E"/>
-        </a:solidFill>
-      </p:bgPr>
-    </p:bg>
-    <p:spTree>
-      <p:nvGrpSpPr>
-        <p:cNvPr id="1" name=""/>
-        <p:cNvGrpSpPr/>
-        <p:nvPr/>
-      </p:nvGrpSpPr>
-      <p:grpSpPr>
-        <a:xfrm>
-          <a:off x="0" y="0"/>
-          <a:ext cx="0" cy="0"/>
-          <a:chOff x="0" y="0"/>
-          <a:chExt cx="0" cy="0"/>
-        </a:xfrm>
-      </p:grpSpPr>
-      <p:sp>
-        <p:nvSpPr>
-          <p:cNvPr name="TextBox 2" id="2"/>
-          <p:cNvSpPr txBox="true"/>
-          <p:nvPr/>
-        </p:nvSpPr>
-        <p:spPr>
-          <a:xfrm rot="0">
-            <a:off x="1028700" y="771525"/>
-            <a:ext cx="4584649" cy="1572957"/>
-          </a:xfrm>
-          <a:prstGeom prst="rect">
-            <a:avLst/>
-          </a:prstGeom>
-        </p:spPr>
-        <p:txBody>
-          <a:bodyPr anchor="t" rtlCol="false" tIns="0" lIns="0" bIns="0" rIns="0">
-            <a:spAutoFit/>
-          </a:bodyPr>
-          <a:lstStyle/>
-          <a:p>
-            <a:pPr algn="r">
-              <a:lnSpc>
-                <a:spcPts val="13091"/>
-              </a:lnSpc>
-            </a:pPr>
-            <a:r>
-              <a:rPr lang="en-US" sz="8727">
-                <a:solidFill>
-                  <a:srgbClr val="FFFFFF"/>
-                </a:solidFill>
-                <a:latin typeface="Bebas Neue"/>
-              </a:rPr>
-              <a:t>Referências:</a:t>
-            </a:r>
-          </a:p>
-        </p:txBody>
-      </p:sp>
-      <p:sp>
-        <p:nvSpPr>
-          <p:cNvPr name="AutoShape 3" id="3"/>
-          <p:cNvSpPr/>
-          <p:nvPr/>
-        </p:nvSpPr>
-        <p:spPr>
-          <a:xfrm rot="0">
-            <a:off x="1028700" y="9248775"/>
-            <a:ext cx="13525126" cy="40984"/>
-          </a:xfrm>
-          <a:prstGeom prst="rect">
-            <a:avLst/>
-          </a:prstGeom>
-          <a:solidFill>
-            <a:srgbClr val="FFFFFF">
-              <a:alpha val="29804"/>
-            </a:srgbClr>
-          </a:solidFill>
-        </p:spPr>
-      </p:sp>
-      <p:sp>
-        <p:nvSpPr>
-          <p:cNvPr name="TextBox 4" id="4"/>
-          <p:cNvSpPr txBox="true"/>
-          <p:nvPr/>
-        </p:nvSpPr>
-        <p:spPr>
-          <a:xfrm rot="0">
-            <a:off x="1028700" y="2258757"/>
-            <a:ext cx="15786383" cy="566419"/>
-          </a:xfrm>
-          <a:prstGeom prst="rect">
-            <a:avLst/>
-          </a:prstGeom>
-        </p:spPr>
-        <p:txBody>
-          <a:bodyPr anchor="t" rtlCol="false" tIns="0" lIns="0" bIns="0" rIns="0">
-            <a:spAutoFit/>
-          </a:bodyPr>
-          <a:lstStyle/>
-          <a:p>
-            <a:pPr>
-              <a:lnSpc>
-                <a:spcPts val="4480"/>
-              </a:lnSpc>
-            </a:pPr>
-            <a:r>
-              <a:rPr lang="en-US" sz="3200">
-                <a:solidFill>
-                  <a:srgbClr val="FFFFFF"/>
-                </a:solidFill>
-                <a:latin typeface="Arialle"/>
-              </a:rPr>
-              <a:t>--------------------------------------------------------------------------------------------------------------------</a:t>
-            </a:r>
-          </a:p>
-        </p:txBody>
-      </p:sp>
     </p:spTree>
   </p:cSld>
   <p:clrMapOvr>

</xml_diff>